<commit_message>
final fixes to presentation
</commit_message>
<xml_diff>
--- a/Loglog(Face).pptx
+++ b/Loglog(Face).pptx
@@ -25512,42 +25512,6 @@
           </a:graphicData>
         </a:graphic>
       </p:graphicFrame>
-      <p:pic>
-        <p:nvPicPr>
-          <p:cNvPr id="7" name="Picture 6" descr="A screenshot of a computer program&#10;&#10;Description automatically generated with medium confidence">
-            <a:extLst>
-              <a:ext uri="{FF2B5EF4-FFF2-40B4-BE49-F238E27FC236}">
-                <a16:creationId xmlns:a16="http://schemas.microsoft.com/office/drawing/2014/main" id="{6F8BB027-446E-39A7-7019-4E7449F0E7C7}"/>
-              </a:ext>
-            </a:extLst>
-          </p:cNvPr>
-          <p:cNvPicPr>
-            <a:picLocks noChangeAspect="1"/>
-          </p:cNvPicPr>
-          <p:nvPr/>
-        </p:nvPicPr>
-        <p:blipFill>
-          <a:blip r:embed="rId7">
-            <a:extLst>
-              <a:ext uri="{28A0092B-C50C-407E-A947-70E740481C1C}">
-                <a14:useLocalDpi xmlns:a14="http://schemas.microsoft.com/office/drawing/2010/main" val="0"/>
-              </a:ext>
-            </a:extLst>
-          </a:blip>
-          <a:stretch>
-            <a:fillRect/>
-          </a:stretch>
-        </p:blipFill>
-        <p:spPr>
-          <a:xfrm>
-            <a:off x="5577537" y="218660"/>
-            <a:ext cx="6265199" cy="3439717"/>
-          </a:xfrm>
-          <a:prstGeom prst="rect">
-            <a:avLst/>
-          </a:prstGeom>
-        </p:spPr>
-      </p:pic>
       <p:sp>
         <p:nvSpPr>
           <p:cNvPr id="9" name="TextBox 8">
@@ -25624,6 +25588,42 @@
           </a:p>
         </p:txBody>
       </p:sp>
+      <p:pic>
+        <p:nvPicPr>
+          <p:cNvPr id="16" name="Picture 15" descr="A screenshot of a computer program&#10;&#10;Description automatically generated with medium confidence">
+            <a:extLst>
+              <a:ext uri="{FF2B5EF4-FFF2-40B4-BE49-F238E27FC236}">
+                <a16:creationId xmlns:a16="http://schemas.microsoft.com/office/drawing/2014/main" id="{A4EDC976-32DB-BDD9-FA02-CEFA1A720FE8}"/>
+              </a:ext>
+            </a:extLst>
+          </p:cNvPr>
+          <p:cNvPicPr>
+            <a:picLocks noChangeAspect="1"/>
+          </p:cNvPicPr>
+          <p:nvPr/>
+        </p:nvPicPr>
+        <p:blipFill>
+          <a:blip r:embed="rId7">
+            <a:extLst>
+              <a:ext uri="{28A0092B-C50C-407E-A947-70E740481C1C}">
+                <a14:useLocalDpi xmlns:a14="http://schemas.microsoft.com/office/drawing/2010/main" val="0"/>
+              </a:ext>
+            </a:extLst>
+          </a:blip>
+          <a:stretch>
+            <a:fillRect/>
+          </a:stretch>
+        </p:blipFill>
+        <p:spPr>
+          <a:xfrm>
+            <a:off x="5535224" y="299873"/>
+            <a:ext cx="6306117" cy="3315348"/>
+          </a:xfrm>
+          <a:prstGeom prst="rect">
+            <a:avLst/>
+          </a:prstGeom>
+        </p:spPr>
+      </p:pic>
     </p:spTree>
     <p:extLst>
       <p:ext uri="{BB962C8B-B14F-4D97-AF65-F5344CB8AC3E}">

</xml_diff>

<commit_message>
final fixes to presentation. now
</commit_message>
<xml_diff>
--- a/Loglog(Face).pptx
+++ b/Loglog(Face).pptx
@@ -113,6 +113,11 @@
       </a:defRPr>
     </a:lvl9pPr>
   </p:defaultTextStyle>
+  <p:extLst>
+    <p:ext uri="{EFAFB233-063F-42B5-8137-9DF3F51BA10A}">
+      <p15:sldGuideLst xmlns:p15="http://schemas.microsoft.com/office/powerpoint/2012/main"/>
+    </p:ext>
+  </p:extLst>
 </p:presentation>
 </file>
 
@@ -6269,7 +6274,7 @@
           <a:pPr rtl="1"/>
           <a:r>
             <a:rPr lang="he-IL" dirty="0"/>
-            <a:t>התמונה מחולקת לתמונות של פרצופים בגול אחיד</a:t>
+            <a:t>התמונה מחולקת לתמונות של פרצופים בגודל אחיד</a:t>
           </a:r>
           <a:endParaRPr lang="en-US" dirty="0"/>
         </a:p>
@@ -8029,7 +8034,7 @@
           </a:pPr>
           <a:r>
             <a:rPr lang="he-IL" sz="2300" kern="1200" dirty="0"/>
-            <a:t>התמונה מחולקת לתמונות של פרצופים בגול אחיד</a:t>
+            <a:t>התמונה מחולקת לתמונות של פרצופים בגודל אחיד</a:t>
           </a:r>
           <a:endParaRPr lang="en-US" sz="2300" kern="1200" dirty="0"/>
         </a:p>
@@ -20628,7 +20633,7 @@
           <a:p>
             <a:fld id="{23FEA57E-7C1A-457B-A4CD-5DCEB057B502}" type="datetime1">
               <a:rPr lang="en-US" smtClean="0"/>
-              <a:t>6/23/2023</a:t>
+              <a:t>6/28/2023</a:t>
             </a:fld>
             <a:endParaRPr lang="en-US" dirty="0"/>
           </a:p>
@@ -20831,7 +20836,7 @@
           <a:p>
             <a:fld id="{11789749-A4CD-447F-8298-2B7988C91CEA}" type="datetime1">
               <a:rPr lang="en-US" smtClean="0"/>
-              <a:t>6/23/2023</a:t>
+              <a:t>6/28/2023</a:t>
             </a:fld>
             <a:endParaRPr lang="en-US"/>
           </a:p>
@@ -21042,7 +21047,7 @@
           <a:p>
             <a:fld id="{BA0444D3-C0BA-4587-A56C-581AB9F841BE}" type="datetime1">
               <a:rPr lang="en-US" smtClean="0"/>
-              <a:t>6/23/2023</a:t>
+              <a:t>6/28/2023</a:t>
             </a:fld>
             <a:endParaRPr lang="en-US"/>
           </a:p>
@@ -21256,7 +21261,7 @@
           <a:p>
             <a:fld id="{201AF2CE-4F37-411C-A3EE-BBBE223265BF}" type="datetime1">
               <a:rPr lang="en-US" smtClean="0"/>
-              <a:t>6/23/2023</a:t>
+              <a:t>6/28/2023</a:t>
             </a:fld>
             <a:endParaRPr lang="en-US"/>
           </a:p>
@@ -21537,7 +21542,7 @@
           <a:p>
             <a:fld id="{C96083D4-708C-4BB5-B4FD-30CE9FA12FD5}" type="datetime1">
               <a:rPr lang="en-US" smtClean="0"/>
-              <a:t>6/23/2023</a:t>
+              <a:t>6/28/2023</a:t>
             </a:fld>
             <a:endParaRPr lang="en-US"/>
           </a:p>
@@ -21817,7 +21822,7 @@
           <a:p>
             <a:fld id="{D0D239B2-65BC-4C2A-A62B-3EABFE9590E4}" type="datetime1">
               <a:rPr lang="en-US" smtClean="0"/>
-              <a:t>6/23/2023</a:t>
+              <a:t>6/28/2023</a:t>
             </a:fld>
             <a:endParaRPr lang="en-US"/>
           </a:p>
@@ -22239,7 +22244,7 @@
           <a:p>
             <a:fld id="{85E05F5A-E4A3-476F-A89E-C2B73F2431E4}" type="datetime1">
               <a:rPr lang="en-US" smtClean="0"/>
-              <a:t>6/23/2023</a:t>
+              <a:t>6/28/2023</a:t>
             </a:fld>
             <a:endParaRPr lang="en-US"/>
           </a:p>
@@ -22384,7 +22389,7 @@
           <a:p>
             <a:fld id="{E3761515-4A26-4F31-9F61-5A10B1FABBFC}" type="datetime1">
               <a:rPr lang="en-US" smtClean="0"/>
-              <a:t>6/23/2023</a:t>
+              <a:t>6/28/2023</a:t>
             </a:fld>
             <a:endParaRPr lang="en-US"/>
           </a:p>
@@ -22500,7 +22505,7 @@
           <a:p>
             <a:fld id="{4A75DC65-7D1F-4BAB-9695-F7E734143E14}" type="datetime1">
               <a:rPr lang="en-US" smtClean="0"/>
-              <a:t>6/23/2023</a:t>
+              <a:t>6/28/2023</a:t>
             </a:fld>
             <a:endParaRPr lang="en-US"/>
           </a:p>
@@ -22814,7 +22819,7 @@
           <a:p>
             <a:fld id="{7E624077-BD55-4036-8E92-6558FDF3B653}" type="datetime1">
               <a:rPr lang="en-US" smtClean="0"/>
-              <a:t>6/23/2023</a:t>
+              <a:t>6/28/2023</a:t>
             </a:fld>
             <a:endParaRPr lang="en-US"/>
           </a:p>
@@ -23108,7 +23113,7 @@
           <a:p>
             <a:fld id="{804225F2-7107-4609-BCC2-77C63064A5E8}" type="datetime1">
               <a:rPr lang="en-US" smtClean="0"/>
-              <a:t>6/23/2023</a:t>
+              <a:t>6/28/2023</a:t>
             </a:fld>
             <a:endParaRPr lang="en-US"/>
           </a:p>
@@ -23356,7 +23361,7 @@
           <a:p>
             <a:fld id="{D3FE42E8-8B57-452D-A122-4DCE9AC771EF}" type="datetime1">
               <a:rPr lang="en-US" smtClean="0"/>
-              <a:t>6/23/2023</a:t>
+              <a:t>6/28/2023</a:t>
             </a:fld>
             <a:endParaRPr lang="en-US"/>
           </a:p>
@@ -23966,7 +23971,7 @@
           <a:lstStyle/>
           <a:p>
             <a:r>
-              <a:rPr lang="en-US" sz="2800">
+              <a:rPr lang="en-US" sz="2800" dirty="0">
                 <a:solidFill>
                   <a:schemeClr val="bg2"/>
                 </a:solidFill>
@@ -24005,14 +24010,14 @@
           <a:lstStyle/>
           <a:p>
             <a:r>
-              <a:rPr lang="he-IL">
+              <a:rPr lang="he-IL" dirty="0">
                 <a:solidFill>
                   <a:schemeClr val="bg2"/>
                 </a:solidFill>
               </a:rPr>
               <a:t>זה פשוט עובד</a:t>
             </a:r>
-            <a:endParaRPr lang="en-US">
+            <a:endParaRPr lang="en-US" dirty="0">
               <a:solidFill>
                 <a:schemeClr val="bg2"/>
               </a:solidFill>
@@ -25177,56 +25182,6 @@
           </a:graphicData>
         </a:graphic>
       </p:graphicFrame>
-      <p:sp>
-        <p:nvSpPr>
-          <p:cNvPr id="4" name="Rectangle 3">
-            <a:hlinkClick r:id="rId7" action="ppaction://hlinksldjump"/>
-            <a:extLst>
-              <a:ext uri="{FF2B5EF4-FFF2-40B4-BE49-F238E27FC236}">
-                <a16:creationId xmlns:a16="http://schemas.microsoft.com/office/drawing/2014/main" id="{F51ED85C-14AE-9FC7-873D-252A0EC355BE}"/>
-              </a:ext>
-            </a:extLst>
-          </p:cNvPr>
-          <p:cNvSpPr/>
-          <p:nvPr/>
-        </p:nvSpPr>
-        <p:spPr>
-          <a:xfrm>
-            <a:off x="124408" y="111968"/>
-            <a:ext cx="1163216" cy="6650670"/>
-          </a:xfrm>
-          <a:prstGeom prst="rect">
-            <a:avLst/>
-          </a:prstGeom>
-          <a:solidFill>
-            <a:schemeClr val="bg1"/>
-          </a:solidFill>
-        </p:spPr>
-        <p:style>
-          <a:lnRef idx="2">
-            <a:schemeClr val="accent1">
-              <a:shade val="15000"/>
-            </a:schemeClr>
-          </a:lnRef>
-          <a:fillRef idx="1">
-            <a:schemeClr val="accent1"/>
-          </a:fillRef>
-          <a:effectRef idx="0">
-            <a:schemeClr val="accent1"/>
-          </a:effectRef>
-          <a:fontRef idx="minor">
-            <a:schemeClr val="lt1"/>
-          </a:fontRef>
-        </p:style>
-        <p:txBody>
-          <a:bodyPr rtlCol="0" anchor="ctr"/>
-          <a:lstStyle/>
-          <a:p>
-            <a:pPr algn="ctr"/>
-            <a:endParaRPr lang="en-US"/>
-          </a:p>
-        </p:txBody>
-      </p:sp>
       <p:pic>
         <p:nvPicPr>
           <p:cNvPr id="8" name="Picture 7" descr="A black background with white text&#10;&#10;Description automatically generated with low confidence">
@@ -25242,7 +25197,7 @@
           <p:nvPr/>
         </p:nvPicPr>
         <p:blipFill>
-          <a:blip r:embed="rId8">
+          <a:blip r:embed="rId7">
             <a:extLst>
               <a:ext uri="{28A0092B-C50C-407E-A947-70E740481C1C}">
                 <a14:useLocalDpi xmlns:a14="http://schemas.microsoft.com/office/drawing/2010/main" val="0"/>
@@ -25804,7 +25759,7 @@
             <p:ph idx="1"/>
             <p:extLst>
               <p:ext uri="{D42A27DB-BD31-4B8C-83A1-F6EECF244321}">
-                <p14:modId xmlns:p14="http://schemas.microsoft.com/office/powerpoint/2010/main" val="2456398227"/>
+                <p14:modId xmlns:p14="http://schemas.microsoft.com/office/powerpoint/2010/main" val="1946368783"/>
               </p:ext>
             </p:extLst>
           </p:nvPr>

</xml_diff>